<commit_message>
Added Advanced Document Properties Examples
</commit_message>
<xml_diff>
--- a/Examples/src/main/resources/com/aspose/slides/examples/ActiveXControls/AddingMediaPlayerActiveXControlInSlides/Output.pptx
+++ b/Examples/src/main/resources/com/aspose/slides/examples/ActiveXControls/AddingMediaPlayerActiveXControlInSlides/Output.pptx
@@ -1,6 +1,6 @@
 
 <file path=ppt/presentation.xml><?xml version="1.0" encoding="utf-8"?>
-<!--Generated by Aspose.Slides for Java 16.4.0.0-->
+<!--Generated by Aspose.Slides for Java 16.5.0.0-->
 <p:presentation xmlns:r="http://schemas.openxmlformats.org/officeDocument/2006/relationships" xmlns:a="http://schemas.openxmlformats.org/drawingml/2006/main" xmlns:p="http://schemas.openxmlformats.org/presentationml/2006/main" saveSubsetFonts="1">
   <p:sldMasterIdLst>
     <p:sldMasterId id="2147483648" r:id="rId1"/>
@@ -308,9 +308,9 @@
           <a:bodyPr/>
           <a:lstStyle/>
           <a:p>
-            <a:fld id="{E8FD0B7A-F5DD-4F40-B4CB-3B2C354B893A}" type="datetimeFigureOut">
-              <a:rPr lang="en-US" smtClean="0" smtId="4294967295"/>
-              <a:t>Date</a:t>
+            <a:fld id="{873E2A09-E2F5-48A0-88E1-48BC818C7B0D}" type="datetimeFigureOut">
+              <a:rPr lang="en-US" smtClean="0" smtId="4294967295"/>
+              <a:t>11/7/2009</a:t>
             </a:fld>
             <a:endParaRPr lang="en-US" smtId="4294967295"/>
           </a:p>
@@ -472,9 +472,9 @@
           <a:bodyPr/>
           <a:lstStyle/>
           <a:p>
-            <a:fld id="{E8FD0B7A-F5DD-4F40-B4CB-3B2C354B893A}" type="datetimeFigureOut">
-              <a:rPr lang="en-US" smtClean="0" smtId="4294967295"/>
-              <a:t>Date</a:t>
+            <a:fld id="{C91A5AC5-0B6F-4C0A-967C-12001C267496}" type="datetimeFigureOut">
+              <a:rPr lang="en-US" smtClean="0" smtId="4294967295"/>
+              <a:t>11/7/2009</a:t>
             </a:fld>
             <a:endParaRPr lang="en-US" smtId="4294967295"/>
           </a:p>
@@ -636,9 +636,9 @@
           <a:bodyPr/>
           <a:lstStyle/>
           <a:p>
-            <a:fld id="{E8FD0B7A-F5DD-4F40-B4CB-3B2C354B893A}" type="datetimeFigureOut">
-              <a:rPr lang="en-US" smtClean="0" smtId="4294967295"/>
-              <a:t>Date</a:t>
+            <a:fld id="{1C9E1A3E-4303-4E46-B3BA-F8AE5B14DBE4}" type="datetimeFigureOut">
+              <a:rPr lang="en-US" smtClean="0" smtId="4294967295"/>
+              <a:t>11/7/2009</a:t>
             </a:fld>
             <a:endParaRPr lang="en-US" smtId="4294967295"/>
           </a:p>
@@ -800,9 +800,9 @@
           <a:bodyPr/>
           <a:lstStyle/>
           <a:p>
-            <a:fld id="{E8FD0B7A-F5DD-4F40-B4CB-3B2C354B893A}" type="datetimeFigureOut">
-              <a:rPr lang="en-US" smtClean="0" smtId="4294967295"/>
-              <a:t>Date</a:t>
+            <a:fld id="{BA623483-08D1-4571-A7BB-DF11927A966B}" type="datetimeFigureOut">
+              <a:rPr lang="en-US" smtClean="0" smtId="4294967295"/>
+              <a:t>11/7/2009</a:t>
             </a:fld>
             <a:endParaRPr lang="en-US" smtId="4294967295"/>
           </a:p>
@@ -1030,9 +1030,9 @@
           <a:bodyPr/>
           <a:lstStyle/>
           <a:p>
-            <a:fld id="{E8FD0B7A-F5DD-4F40-B4CB-3B2C354B893A}" type="datetimeFigureOut">
-              <a:rPr lang="en-US" smtClean="0" smtId="4294967295"/>
-              <a:t>Date</a:t>
+            <a:fld id="{3DD85DE0-172C-47DE-8177-CF7CA4C476E6}" type="datetimeFigureOut">
+              <a:rPr lang="en-US" smtClean="0" smtId="4294967295"/>
+              <a:t>11/7/2009</a:t>
             </a:fld>
             <a:endParaRPr lang="en-US" smtId="4294967295"/>
           </a:p>
@@ -1301,9 +1301,9 @@
           <a:bodyPr/>
           <a:lstStyle/>
           <a:p>
-            <a:fld id="{E8FD0B7A-F5DD-4F40-B4CB-3B2C354B893A}" type="datetimeFigureOut">
-              <a:rPr lang="en-US" smtClean="0" smtId="4294967295"/>
-              <a:t>Date</a:t>
+            <a:fld id="{FB3D3D9B-32CD-4E0D-97E7-6CEB26411BB2}" type="datetimeFigureOut">
+              <a:rPr lang="en-US" smtClean="0" smtId="4294967295"/>
+              <a:t>11/7/2009</a:t>
             </a:fld>
             <a:endParaRPr lang="en-US" smtId="4294967295"/>
           </a:p>
@@ -1690,9 +1690,9 @@
           <a:bodyPr/>
           <a:lstStyle/>
           <a:p>
-            <a:fld id="{E8FD0B7A-F5DD-4F40-B4CB-3B2C354B893A}" type="datetimeFigureOut">
-              <a:rPr lang="en-US" smtClean="0" smtId="4294967295"/>
-              <a:t>Date</a:t>
+            <a:fld id="{2249167E-B328-4672-83D6-F43E8AFE08E0}" type="datetimeFigureOut">
+              <a:rPr lang="en-US" smtClean="0" smtId="4294967295"/>
+              <a:t>11/7/2009</a:t>
             </a:fld>
             <a:endParaRPr lang="en-US" smtId="4294967295"/>
           </a:p>
@@ -1803,9 +1803,9 @@
           <a:bodyPr/>
           <a:lstStyle/>
           <a:p>
-            <a:fld id="{E8FD0B7A-F5DD-4F40-B4CB-3B2C354B893A}" type="datetimeFigureOut">
-              <a:rPr lang="en-US" smtClean="0" smtId="4294967295"/>
-              <a:t>Date</a:t>
+            <a:fld id="{7E7110E0-14B6-4A2D-9036-851B33674662}" type="datetimeFigureOut">
+              <a:rPr lang="en-US" smtClean="0" smtId="4294967295"/>
+              <a:t>11/7/2009</a:t>
             </a:fld>
             <a:endParaRPr lang="en-US" smtId="4294967295"/>
           </a:p>
@@ -1893,9 +1893,9 @@
           <a:bodyPr/>
           <a:lstStyle/>
           <a:p>
-            <a:fld id="{E8FD0B7A-F5DD-4F40-B4CB-3B2C354B893A}" type="datetimeFigureOut">
-              <a:rPr lang="en-US" smtClean="0" smtId="4294967295"/>
-              <a:t>Date</a:t>
+            <a:fld id="{5212FB04-2050-4FD3-A765-8CFAC511AD93}" type="datetimeFigureOut">
+              <a:rPr lang="en-US" smtClean="0" smtId="4294967295"/>
+              <a:t>11/7/2009</a:t>
             </a:fld>
             <a:endParaRPr lang="en-US" smtId="4294967295"/>
           </a:p>
@@ -2148,9 +2148,9 @@
           <a:bodyPr/>
           <a:lstStyle/>
           <a:p>
-            <a:fld id="{E8FD0B7A-F5DD-4F40-B4CB-3B2C354B893A}" type="datetimeFigureOut">
-              <a:rPr lang="en-US" smtClean="0" smtId="4294967295"/>
-              <a:t>Date</a:t>
+            <a:fld id="{8494480D-BCB7-40CE-8657-6B666EC12FF3}" type="datetimeFigureOut">
+              <a:rPr lang="en-US" smtClean="0" smtId="4294967295"/>
+              <a:t>11/7/2009</a:t>
             </a:fld>
             <a:endParaRPr lang="en-US" smtId="4294967295"/>
           </a:p>
@@ -2380,9 +2380,9 @@
           <a:bodyPr/>
           <a:lstStyle/>
           <a:p>
-            <a:fld id="{E8FD0B7A-F5DD-4F40-B4CB-3B2C354B893A}" type="datetimeFigureOut">
-              <a:rPr lang="en-US" smtClean="0" smtId="4294967295"/>
-              <a:t>Date</a:t>
+            <a:fld id="{BEB2827A-7476-4BEC-9BA3-230365EDB031}" type="datetimeFigureOut">
+              <a:rPr lang="en-US" smtClean="0" smtId="4294967295"/>
+              <a:t>11/7/2009</a:t>
             </a:fld>
             <a:endParaRPr lang="en-US" smtId="4294967295"/>
           </a:p>
@@ -3019,7 +3019,7 @@
           <a:p>
             <a:pPr algn="ctr"/>
             <a:r>
-              <a:t>Created with Aspose.Slides for Java 16.4.0.0.</a:t>
+              <a:t>Created with Aspose.Slides for Java 16.5.0.0.</a:t>
             </a:r>
           </a:p>
           <a:p>
@@ -3077,10 +3077,10 @@
 
 <file path=ppt/tags/tag1.xml><?xml version="1.0" encoding="utf-8"?>
 <p:tagLst xmlns:p="http://schemas.openxmlformats.org/presentationml/2006/main">
-  <p:tag name="AS_OS" val="Microsoft Windows NT 6.3"/>
-  <p:tag name="AS_RELEASE_DATE" val="2016.05.16"/>
+  <p:tag name="AS_OS" val="Mac OS X 10.11 unknown"/>
+  <p:tag name="AS_RELEASE_DATE" val="2016.06.11"/>
   <p:tag name="AS_TITLE" val="Aspose.Slides for Java"/>
-  <p:tag name="AS_VERSION" val="16.4.0.0"/>
+  <p:tag name="AS_VERSION" val="16.5.0.0"/>
 </p:tagLst>
 </file>
 

</xml_diff>